<commit_message>
Class prep wrap up?
</commit_message>
<xml_diff>
--- a/Presentations/Sept 11 - Class 2.pptx
+++ b/Presentations/Sept 11 - Class 2.pptx
@@ -16,12 +16,23 @@
     <p:sldId id="271" r:id="rId10"/>
     <p:sldId id="272" r:id="rId11"/>
     <p:sldId id="264" r:id="rId12"/>
-    <p:sldId id="273" r:id="rId13"/>
-    <p:sldId id="265" r:id="rId14"/>
-    <p:sldId id="268" r:id="rId15"/>
-    <p:sldId id="267" r:id="rId16"/>
-    <p:sldId id="266" r:id="rId17"/>
-    <p:sldId id="263" r:id="rId18"/>
+    <p:sldId id="278" r:id="rId13"/>
+    <p:sldId id="274" r:id="rId14"/>
+    <p:sldId id="275" r:id="rId15"/>
+    <p:sldId id="273" r:id="rId16"/>
+    <p:sldId id="265" r:id="rId17"/>
+    <p:sldId id="268" r:id="rId18"/>
+    <p:sldId id="280" r:id="rId19"/>
+    <p:sldId id="279" r:id="rId20"/>
+    <p:sldId id="267" r:id="rId21"/>
+    <p:sldId id="263" r:id="rId22"/>
+    <p:sldId id="277" r:id="rId23"/>
+    <p:sldId id="276" r:id="rId24"/>
+    <p:sldId id="282" r:id="rId25"/>
+    <p:sldId id="283" r:id="rId26"/>
+    <p:sldId id="284" r:id="rId27"/>
+    <p:sldId id="285" r:id="rId28"/>
+    <p:sldId id="281" r:id="rId29"/>
   </p:sldIdLst>
   <p:sldSz cx="12192000" cy="6858000"/>
   <p:notesSz cx="6858000" cy="9144000"/>
@@ -3241,7 +3252,7 @@
           <a:p>
             <a:r>
               <a:rPr lang="en-US" dirty="0"/>
-              <a:t>More on Conditionals</a:t>
+              <a:t>Is That A Bomb????</a:t>
             </a:r>
           </a:p>
         </p:txBody>
@@ -3306,7 +3317,7 @@
           <p:cNvPr id="2" name="Title 1">
             <a:extLst>
               <a:ext uri="{FF2B5EF4-FFF2-40B4-BE49-F238E27FC236}">
-                <a16:creationId xmlns:a16="http://schemas.microsoft.com/office/drawing/2014/main" id="{3ED8F210-B7E5-472C-B874-0DEE8F2DB19D}"/>
+                <a16:creationId xmlns:a16="http://schemas.microsoft.com/office/drawing/2014/main" id="{29A99A26-B069-406B-8C20-DDFEC734041D}"/>
               </a:ext>
             </a:extLst>
           </p:cNvPr>
@@ -3322,7 +3333,10 @@
           <a:bodyPr/>
           <a:lstStyle/>
           <a:p>
-            <a:endParaRPr lang="en-US"/>
+            <a:r>
+              <a:rPr lang="en-US" dirty="0"/>
+              <a:t>4. Conditionals</a:t>
+            </a:r>
           </a:p>
         </p:txBody>
       </p:sp>
@@ -3331,7 +3345,7 @@
           <p:cNvPr id="3" name="Text Placeholder 2">
             <a:extLst>
               <a:ext uri="{FF2B5EF4-FFF2-40B4-BE49-F238E27FC236}">
-                <a16:creationId xmlns:a16="http://schemas.microsoft.com/office/drawing/2014/main" id="{E376C0CA-D5AB-4D71-8ECD-251D135BD52E}"/>
+                <a16:creationId xmlns:a16="http://schemas.microsoft.com/office/drawing/2014/main" id="{182A1791-3E24-4F19-82FC-D1A187825799}"/>
               </a:ext>
             </a:extLst>
           </p:cNvPr>
@@ -3354,7 +3368,7 @@
     </p:spTree>
     <p:extLst>
       <p:ext uri="{BB962C8B-B14F-4D97-AF65-F5344CB8AC3E}">
-        <p14:creationId xmlns:p14="http://schemas.microsoft.com/office/powerpoint/2010/main" val="2183162242"/>
+        <p14:creationId xmlns:p14="http://schemas.microsoft.com/office/powerpoint/2010/main" val="894005652"/>
       </p:ext>
     </p:extLst>
   </p:cSld>
@@ -3383,10 +3397,10 @@
       </p:grpSpPr>
       <p:sp>
         <p:nvSpPr>
-          <p:cNvPr id="2" name="Title 1">
+          <p:cNvPr id="4" name="Title 3">
             <a:extLst>
               <a:ext uri="{FF2B5EF4-FFF2-40B4-BE49-F238E27FC236}">
-                <a16:creationId xmlns:a16="http://schemas.microsoft.com/office/drawing/2014/main" id="{7219A49C-C84C-4DB4-945B-D28F21D3ADD0}"/>
+                <a16:creationId xmlns:a16="http://schemas.microsoft.com/office/drawing/2014/main" id="{2DA4E4DE-7A9C-43B5-B780-6E51233110E4}"/>
               </a:ext>
             </a:extLst>
           </p:cNvPr>
@@ -3404,43 +3418,47 @@
           <a:p>
             <a:r>
               <a:rPr lang="en-US" dirty="0"/>
-              <a:t>Basic Input</a:t>
-            </a:r>
-          </a:p>
-        </p:txBody>
-      </p:sp>
-      <p:sp>
-        <p:nvSpPr>
-          <p:cNvPr id="3" name="Text Placeholder 2">
+              <a:t>Conditionals In English</a:t>
+            </a:r>
+          </a:p>
+        </p:txBody>
+      </p:sp>
+      <p:pic>
+        <p:nvPicPr>
+          <p:cNvPr id="8" name="Content Placeholder 7">
             <a:extLst>
               <a:ext uri="{FF2B5EF4-FFF2-40B4-BE49-F238E27FC236}">
-                <a16:creationId xmlns:a16="http://schemas.microsoft.com/office/drawing/2014/main" id="{3B86CDA2-336B-4432-BC8D-9E5E184E7396}"/>
+                <a16:creationId xmlns:a16="http://schemas.microsoft.com/office/drawing/2014/main" id="{74C213EB-2496-4612-8294-DAEDA0F06D5C}"/>
               </a:ext>
             </a:extLst>
           </p:cNvPr>
-          <p:cNvSpPr>
-            <a:spLocks noGrp="1"/>
-          </p:cNvSpPr>
-          <p:nvPr>
-            <p:ph type="body" idx="1"/>
-          </p:nvPr>
-        </p:nvSpPr>
-        <p:spPr/>
-        <p:txBody>
-          <a:bodyPr/>
-          <a:lstStyle/>
-          <a:p>
-            <a:r>
-              <a:rPr lang="en-US" dirty="0"/>
-              <a:t>Input events</a:t>
-            </a:r>
-          </a:p>
-        </p:txBody>
-      </p:sp>
+          <p:cNvPicPr>
+            <a:picLocks noGrp="1" noChangeAspect="1"/>
+          </p:cNvPicPr>
+          <p:nvPr>
+            <p:ph idx="1"/>
+          </p:nvPr>
+        </p:nvPicPr>
+        <p:blipFill>
+          <a:blip r:embed="rId2"/>
+          <a:stretch>
+            <a:fillRect/>
+          </a:stretch>
+        </p:blipFill>
+        <p:spPr>
+          <a:xfrm>
+            <a:off x="838200" y="3038991"/>
+            <a:ext cx="10515600" cy="1924605"/>
+          </a:xfrm>
+          <a:prstGeom prst="rect">
+            <a:avLst/>
+          </a:prstGeom>
+        </p:spPr>
+      </p:pic>
     </p:spTree>
     <p:extLst>
       <p:ext uri="{BB962C8B-B14F-4D97-AF65-F5344CB8AC3E}">
-        <p14:creationId xmlns:p14="http://schemas.microsoft.com/office/powerpoint/2010/main" val="1321457643"/>
+        <p14:creationId xmlns:p14="http://schemas.microsoft.com/office/powerpoint/2010/main" val="3305204008"/>
       </p:ext>
     </p:extLst>
   </p:cSld>
@@ -3469,10 +3487,10 @@
       </p:grpSpPr>
       <p:sp>
         <p:nvSpPr>
-          <p:cNvPr id="2" name="Title 1">
+          <p:cNvPr id="4" name="Title 3">
             <a:extLst>
               <a:ext uri="{FF2B5EF4-FFF2-40B4-BE49-F238E27FC236}">
-                <a16:creationId xmlns:a16="http://schemas.microsoft.com/office/drawing/2014/main" id="{5D55DD6D-A7FF-4700-A96E-0C61FD4A99CF}"/>
+                <a16:creationId xmlns:a16="http://schemas.microsoft.com/office/drawing/2014/main" id="{2DA4E4DE-7A9C-43B5-B780-6E51233110E4}"/>
               </a:ext>
             </a:extLst>
           </p:cNvPr>
@@ -3490,17 +3508,17 @@
           <a:p>
             <a:r>
               <a:rPr lang="en-US" dirty="0"/>
-              <a:t>Numbers that Change</a:t>
-            </a:r>
-          </a:p>
-        </p:txBody>
-      </p:sp>
-      <p:sp>
-        <p:nvSpPr>
-          <p:cNvPr id="3" name="Content Placeholder 2">
+              <a:t>Conditionals In English</a:t>
+            </a:r>
+          </a:p>
+        </p:txBody>
+      </p:sp>
+      <p:sp>
+        <p:nvSpPr>
+          <p:cNvPr id="5" name="Content Placeholder 4">
             <a:extLst>
               <a:ext uri="{FF2B5EF4-FFF2-40B4-BE49-F238E27FC236}">
-                <a16:creationId xmlns:a16="http://schemas.microsoft.com/office/drawing/2014/main" id="{7C9BF6DF-2183-4ECB-B62D-E5800FB51680}"/>
+                <a16:creationId xmlns:a16="http://schemas.microsoft.com/office/drawing/2014/main" id="{9C6DBFDD-695E-4EC5-8AFC-DEA7E133217D}"/>
               </a:ext>
             </a:extLst>
           </p:cNvPr>
@@ -3516,14 +3534,68 @@
           <a:bodyPr/>
           <a:lstStyle/>
           <a:p>
-            <a:endParaRPr lang="en-US"/>
+            <a:pPr marL="0" lvl="0" indent="0" eaLnBrk="0" fontAlgn="base" hangingPunct="0">
+              <a:lnSpc>
+                <a:spcPct val="100000"/>
+              </a:lnSpc>
+              <a:spcBef>
+                <a:spcPct val="0"/>
+              </a:spcBef>
+              <a:spcAft>
+                <a:spcPct val="0"/>
+              </a:spcAft>
+              <a:buNone/>
+            </a:pPr>
+            <a:r>
+              <a:rPr lang="en-US" altLang="en-US" dirty="0"/>
+              <a:t>"If you see a bear, run!"</a:t>
+            </a:r>
+          </a:p>
+          <a:p>
+            <a:pPr marL="0" lvl="0" indent="0" eaLnBrk="0" fontAlgn="base" hangingPunct="0">
+              <a:lnSpc>
+                <a:spcPct val="100000"/>
+              </a:lnSpc>
+              <a:spcBef>
+                <a:spcPct val="0"/>
+              </a:spcBef>
+              <a:spcAft>
+                <a:spcPct val="0"/>
+              </a:spcAft>
+              <a:buNone/>
+            </a:pPr>
+            <a:r>
+              <a:rPr lang="en-US" altLang="en-US" dirty="0"/>
+              <a:t>"If you're going to be late, give me a call."</a:t>
+            </a:r>
+          </a:p>
+          <a:p>
+            <a:endParaRPr lang="en-US" dirty="0"/>
+          </a:p>
+          <a:p>
+            <a:pPr marL="0" indent="0">
+              <a:buNone/>
+            </a:pPr>
+            <a:r>
+              <a:rPr lang="en-US" dirty="0"/>
+              <a:t>"If there's an orange soda, I'll take that. If not, I'll have a cola."</a:t>
+            </a:r>
+          </a:p>
+          <a:p>
+            <a:pPr marL="0" indent="0">
+              <a:buNone/>
+            </a:pPr>
+            <a:r>
+              <a:rPr lang="en-US" dirty="0"/>
+              <a:t>"If you can't make it, that's fine."</a:t>
+            </a:r>
           </a:p>
         </p:txBody>
       </p:sp>
     </p:spTree>
     <p:extLst>
       <p:ext uri="{BB962C8B-B14F-4D97-AF65-F5344CB8AC3E}">
-        <p14:creationId xmlns:p14="http://schemas.microsoft.com/office/powerpoint/2010/main" val="2234409147"/>
+        <p14:creationId xmlns:p14="http://schemas.microsoft.com/office/powerpoint/2010/main" val="734629472"/>
       </p:ext>
     </p:extLst>
   </p:cSld>
@@ -3552,10 +3624,10 @@
       </p:grpSpPr>
       <p:sp>
         <p:nvSpPr>
-          <p:cNvPr id="2" name="Title 1">
+          <p:cNvPr id="4" name="Title 3">
             <a:extLst>
               <a:ext uri="{FF2B5EF4-FFF2-40B4-BE49-F238E27FC236}">
-                <a16:creationId xmlns:a16="http://schemas.microsoft.com/office/drawing/2014/main" id="{06F19199-706C-41E9-A1DD-763BAD27282E}"/>
+                <a16:creationId xmlns:a16="http://schemas.microsoft.com/office/drawing/2014/main" id="{F59617B6-F1B8-491C-8C16-4DDF3D901E95}"/>
               </a:ext>
             </a:extLst>
           </p:cNvPr>
@@ -3573,203 +3645,372 @@
           <a:p>
             <a:r>
               <a:rPr lang="en-US" dirty="0"/>
-              <a:t>How Does p5.js provide event information?</a:t>
-            </a:r>
-          </a:p>
-        </p:txBody>
-      </p:sp>
-      <p:sp>
-        <p:nvSpPr>
-          <p:cNvPr id="3" name="Text Placeholder 2">
+              <a:t>Boolean Operators</a:t>
+            </a:r>
+          </a:p>
+        </p:txBody>
+      </p:sp>
+      <p:graphicFrame>
+        <p:nvGraphicFramePr>
+          <p:cNvPr id="5" name="Table 4">
             <a:extLst>
               <a:ext uri="{FF2B5EF4-FFF2-40B4-BE49-F238E27FC236}">
-                <a16:creationId xmlns:a16="http://schemas.microsoft.com/office/drawing/2014/main" id="{D7B9D9D1-C918-44B2-B38D-41CA0CE1D195}"/>
+                <a16:creationId xmlns:a16="http://schemas.microsoft.com/office/drawing/2014/main" id="{7C0C21FA-C788-455E-9CDE-355465B2C291}"/>
               </a:ext>
             </a:extLst>
           </p:cNvPr>
-          <p:cNvSpPr>
-            <a:spLocks noGrp="1"/>
-          </p:cNvSpPr>
-          <p:nvPr>
-            <p:ph type="body" idx="1"/>
-          </p:nvPr>
-        </p:nvSpPr>
-        <p:spPr/>
-        <p:txBody>
-          <a:bodyPr/>
-          <a:lstStyle/>
-          <a:p>
-            <a:r>
-              <a:rPr lang="en-US" dirty="0"/>
-              <a:t>Boolean Variables</a:t>
-            </a:r>
-          </a:p>
-        </p:txBody>
-      </p:sp>
-      <p:sp>
-        <p:nvSpPr>
-          <p:cNvPr id="4" name="Content Placeholder 3">
-            <a:extLst>
-              <a:ext uri="{FF2B5EF4-FFF2-40B4-BE49-F238E27FC236}">
-                <a16:creationId xmlns:a16="http://schemas.microsoft.com/office/drawing/2014/main" id="{6E8D5644-6E8D-4E9F-AF38-C06F27676F60}"/>
-              </a:ext>
-            </a:extLst>
-          </p:cNvPr>
-          <p:cNvSpPr>
-            <a:spLocks noGrp="1"/>
-          </p:cNvSpPr>
-          <p:nvPr>
-            <p:ph sz="half" idx="2"/>
-          </p:nvPr>
-        </p:nvSpPr>
-        <p:spPr/>
-        <p:txBody>
-          <a:bodyPr/>
-          <a:lstStyle/>
-          <a:p>
-            <a:r>
-              <a:rPr lang="en-US" dirty="0" err="1">
-                <a:latin typeface="Courier New" panose="02070309020205020404" pitchFamily="49" charset="0"/>
-                <a:cs typeface="Courier New" panose="02070309020205020404" pitchFamily="49" charset="0"/>
-              </a:rPr>
-              <a:t>mouseIsPressed</a:t>
-            </a:r>
-            <a:endParaRPr lang="en-US" dirty="0">
-              <a:latin typeface="Courier New" panose="02070309020205020404" pitchFamily="49" charset="0"/>
-              <a:cs typeface="Courier New" panose="02070309020205020404" pitchFamily="49" charset="0"/>
-            </a:endParaRPr>
-          </a:p>
-          <a:p>
-            <a:r>
-              <a:rPr lang="en-US" dirty="0" err="1">
-                <a:latin typeface="Courier New" panose="02070309020205020404" pitchFamily="49" charset="0"/>
-                <a:cs typeface="Courier New" panose="02070309020205020404" pitchFamily="49" charset="0"/>
-              </a:rPr>
-              <a:t>keyIsPressed</a:t>
-            </a:r>
-            <a:endParaRPr lang="en-US" dirty="0">
-              <a:latin typeface="Courier New" panose="02070309020205020404" pitchFamily="49" charset="0"/>
-              <a:cs typeface="Courier New" panose="02070309020205020404" pitchFamily="49" charset="0"/>
-            </a:endParaRPr>
-          </a:p>
-          <a:p>
-            <a:endParaRPr lang="en-US" dirty="0">
-              <a:latin typeface="Courier New" panose="02070309020205020404" pitchFamily="49" charset="0"/>
-              <a:cs typeface="Courier New" panose="02070309020205020404" pitchFamily="49" charset="0"/>
-            </a:endParaRPr>
-          </a:p>
-        </p:txBody>
-      </p:sp>
-      <p:sp>
-        <p:nvSpPr>
-          <p:cNvPr id="5" name="Text Placeholder 4">
-            <a:extLst>
-              <a:ext uri="{FF2B5EF4-FFF2-40B4-BE49-F238E27FC236}">
-                <a16:creationId xmlns:a16="http://schemas.microsoft.com/office/drawing/2014/main" id="{C74ED259-B657-4C61-A2C4-3D9FD1FD35CB}"/>
-              </a:ext>
-            </a:extLst>
-          </p:cNvPr>
-          <p:cNvSpPr>
-            <a:spLocks noGrp="1"/>
-          </p:cNvSpPr>
-          <p:nvPr>
-            <p:ph type="body" sz="quarter" idx="3"/>
-          </p:nvPr>
-        </p:nvSpPr>
-        <p:spPr>
-          <a:xfrm>
-            <a:off x="5683348" y="1681163"/>
-            <a:ext cx="5672040" cy="823912"/>
-          </a:xfrm>
-        </p:spPr>
-        <p:txBody>
-          <a:bodyPr/>
-          <a:lstStyle/>
-          <a:p>
-            <a:r>
-              <a:rPr lang="en-US" dirty="0"/>
-              <a:t>Event Functions</a:t>
-            </a:r>
-          </a:p>
-        </p:txBody>
-      </p:sp>
-      <p:sp>
-        <p:nvSpPr>
-          <p:cNvPr id="6" name="Content Placeholder 5">
-            <a:extLst>
-              <a:ext uri="{FF2B5EF4-FFF2-40B4-BE49-F238E27FC236}">
-                <a16:creationId xmlns:a16="http://schemas.microsoft.com/office/drawing/2014/main" id="{92FBA8AD-05BE-48E6-8246-123F8B1441E3}"/>
-              </a:ext>
-            </a:extLst>
-          </p:cNvPr>
-          <p:cNvSpPr>
-            <a:spLocks noGrp="1"/>
-          </p:cNvSpPr>
-          <p:nvPr>
-            <p:ph sz="quarter" idx="4"/>
-          </p:nvPr>
-        </p:nvSpPr>
-        <p:spPr>
-          <a:xfrm>
-            <a:off x="5683348" y="2505075"/>
-            <a:ext cx="6372664" cy="3684588"/>
-          </a:xfrm>
-        </p:spPr>
-        <p:txBody>
-          <a:bodyPr/>
-          <a:lstStyle/>
-          <a:p>
-            <a:r>
-              <a:rPr lang="en-US" dirty="0">
-                <a:latin typeface="Courier New" panose="02070309020205020404" pitchFamily="49" charset="0"/>
-                <a:cs typeface="Courier New" panose="02070309020205020404" pitchFamily="49" charset="0"/>
-              </a:rPr>
-              <a:t>function </a:t>
-            </a:r>
-            <a:r>
-              <a:rPr lang="en-US" dirty="0" err="1">
-                <a:latin typeface="Courier New" panose="02070309020205020404" pitchFamily="49" charset="0"/>
-                <a:cs typeface="Courier New" panose="02070309020205020404" pitchFamily="49" charset="0"/>
-              </a:rPr>
-              <a:t>mousePressed</a:t>
-            </a:r>
-            <a:r>
-              <a:rPr lang="en-US" dirty="0">
-                <a:latin typeface="Courier New" panose="02070309020205020404" pitchFamily="49" charset="0"/>
-                <a:cs typeface="Courier New" panose="02070309020205020404" pitchFamily="49" charset="0"/>
-              </a:rPr>
-              <a:t>() { }</a:t>
-            </a:r>
-          </a:p>
-          <a:p>
-            <a:r>
-              <a:rPr lang="en-US" dirty="0">
-                <a:latin typeface="Courier New" panose="02070309020205020404" pitchFamily="49" charset="0"/>
-                <a:cs typeface="Courier New" panose="02070309020205020404" pitchFamily="49" charset="0"/>
-              </a:rPr>
-              <a:t>function </a:t>
-            </a:r>
-            <a:r>
-              <a:rPr lang="en-US" dirty="0" err="1">
-                <a:latin typeface="Courier New" panose="02070309020205020404" pitchFamily="49" charset="0"/>
-                <a:cs typeface="Courier New" panose="02070309020205020404" pitchFamily="49" charset="0"/>
-              </a:rPr>
-              <a:t>keyPressed</a:t>
-            </a:r>
-            <a:r>
-              <a:rPr lang="en-US" dirty="0">
-                <a:latin typeface="Courier New" panose="02070309020205020404" pitchFamily="49" charset="0"/>
-                <a:cs typeface="Courier New" panose="02070309020205020404" pitchFamily="49" charset="0"/>
-              </a:rPr>
-              <a:t>() { }</a:t>
-            </a:r>
-          </a:p>
-        </p:txBody>
-      </p:sp>
+          <p:cNvGraphicFramePr>
+            <a:graphicFrameLocks noGrp="1"/>
+          </p:cNvGraphicFramePr>
+          <p:nvPr>
+            <p:extLst>
+              <p:ext uri="{D42A27DB-BD31-4B8C-83A1-F6EECF244321}">
+                <p14:modId xmlns:p14="http://schemas.microsoft.com/office/powerpoint/2010/main" val="2284868587"/>
+              </p:ext>
+            </p:extLst>
+          </p:nvPr>
+        </p:nvGraphicFramePr>
+        <p:xfrm>
+          <a:off x="838200" y="2056097"/>
+          <a:ext cx="10515603" cy="3683520"/>
+        </p:xfrm>
+        <a:graphic>
+          <a:graphicData uri="http://schemas.openxmlformats.org/drawingml/2006/table">
+            <a:tbl>
+              <a:tblPr bandRow="1">
+                <a:tableStyleId>{D7AC3CCA-C797-4891-BE02-D94E43425B78}</a:tableStyleId>
+              </a:tblPr>
+              <a:tblGrid>
+                <a:gridCol w="3505201">
+                  <a:extLst>
+                    <a:ext uri="{9D8B030D-6E8A-4147-A177-3AD203B41FA5}">
+                      <a16:colId xmlns:a16="http://schemas.microsoft.com/office/drawing/2014/main" val="818887629"/>
+                    </a:ext>
+                  </a:extLst>
+                </a:gridCol>
+                <a:gridCol w="3505201">
+                  <a:extLst>
+                    <a:ext uri="{9D8B030D-6E8A-4147-A177-3AD203B41FA5}">
+                      <a16:colId xmlns:a16="http://schemas.microsoft.com/office/drawing/2014/main" val="3750536532"/>
+                    </a:ext>
+                  </a:extLst>
+                </a:gridCol>
+                <a:gridCol w="3505201">
+                  <a:extLst>
+                    <a:ext uri="{9D8B030D-6E8A-4147-A177-3AD203B41FA5}">
+                      <a16:colId xmlns:a16="http://schemas.microsoft.com/office/drawing/2014/main" val="1253891732"/>
+                    </a:ext>
+                  </a:extLst>
+                </a:gridCol>
+              </a:tblGrid>
+              <a:tr h="736704">
+                <a:tc>
+                  <a:txBody>
+                    <a:bodyPr/>
+                    <a:lstStyle/>
+                    <a:p>
+                      <a:pPr algn="ctr"/>
+                      <a:r>
+                        <a:rPr lang="en-US" sz="3200" dirty="0"/>
+                        <a:t>&lt;</a:t>
+                      </a:r>
+                    </a:p>
+                  </a:txBody>
+                  <a:tcPr anchor="ctr"/>
+                </a:tc>
+                <a:tc>
+                  <a:txBody>
+                    <a:bodyPr/>
+                    <a:lstStyle/>
+                    <a:p>
+                      <a:pPr algn="ctr"/>
+                      <a:r>
+                        <a:rPr lang="en-US" sz="3200" dirty="0"/>
+                        <a:t>Less than</a:t>
+                      </a:r>
+                    </a:p>
+                  </a:txBody>
+                  <a:tcPr anchor="ctr"/>
+                </a:tc>
+                <a:tc>
+                  <a:txBody>
+                    <a:bodyPr/>
+                    <a:lstStyle/>
+                    <a:p>
+                      <a:r>
+                        <a:rPr lang="en-US" dirty="0">
+                          <a:latin typeface="Courier New" panose="02070309020205020404" pitchFamily="49" charset="0"/>
+                          <a:cs typeface="Courier New" panose="02070309020205020404" pitchFamily="49" charset="0"/>
+                        </a:rPr>
+                        <a:t>True: 4 &lt; 5</a:t>
+                      </a:r>
+                    </a:p>
+                    <a:p>
+                      <a:r>
+                        <a:rPr lang="en-US" dirty="0">
+                          <a:latin typeface="Courier New" panose="02070309020205020404" pitchFamily="49" charset="0"/>
+                          <a:cs typeface="Courier New" panose="02070309020205020404" pitchFamily="49" charset="0"/>
+                        </a:rPr>
+                        <a:t>False: 100 &lt; 0</a:t>
+                      </a:r>
+                    </a:p>
+                  </a:txBody>
+                  <a:tcPr anchor="ctr"/>
+                </a:tc>
+                <a:extLst>
+                  <a:ext uri="{0D108BD9-81ED-4DB2-BD59-A6C34878D82A}">
+                    <a16:rowId xmlns:a16="http://schemas.microsoft.com/office/drawing/2014/main" val="4107327455"/>
+                  </a:ext>
+                </a:extLst>
+              </a:tr>
+              <a:tr h="736704">
+                <a:tc>
+                  <a:txBody>
+                    <a:bodyPr/>
+                    <a:lstStyle/>
+                    <a:p>
+                      <a:pPr algn="ctr"/>
+                      <a:r>
+                        <a:rPr lang="en-US" sz="3200" dirty="0"/>
+                        <a:t>&gt; </a:t>
+                      </a:r>
+                    </a:p>
+                  </a:txBody>
+                  <a:tcPr anchor="ctr"/>
+                </a:tc>
+                <a:tc>
+                  <a:txBody>
+                    <a:bodyPr/>
+                    <a:lstStyle/>
+                    <a:p>
+                      <a:pPr algn="ctr"/>
+                      <a:r>
+                        <a:rPr lang="en-US" sz="3200" dirty="0"/>
+                        <a:t>Greater than</a:t>
+                      </a:r>
+                    </a:p>
+                  </a:txBody>
+                  <a:tcPr anchor="ctr"/>
+                </a:tc>
+                <a:tc>
+                  <a:txBody>
+                    <a:bodyPr/>
+                    <a:lstStyle/>
+                    <a:p>
+                      <a:r>
+                        <a:rPr lang="en-US" dirty="0">
+                          <a:latin typeface="Courier New" panose="02070309020205020404" pitchFamily="49" charset="0"/>
+                          <a:cs typeface="Courier New" panose="02070309020205020404" pitchFamily="49" charset="0"/>
+                        </a:rPr>
+                        <a:t>True: 15 &gt; 7</a:t>
+                      </a:r>
+                    </a:p>
+                    <a:p>
+                      <a:r>
+                        <a:rPr lang="en-US" dirty="0">
+                          <a:latin typeface="Courier New" panose="02070309020205020404" pitchFamily="49" charset="0"/>
+                          <a:cs typeface="Courier New" panose="02070309020205020404" pitchFamily="49" charset="0"/>
+                        </a:rPr>
+                        <a:t>False: -1 &gt; 1</a:t>
+                      </a:r>
+                    </a:p>
+                  </a:txBody>
+                  <a:tcPr anchor="ctr"/>
+                </a:tc>
+                <a:extLst>
+                  <a:ext uri="{0D108BD9-81ED-4DB2-BD59-A6C34878D82A}">
+                    <a16:rowId xmlns:a16="http://schemas.microsoft.com/office/drawing/2014/main" val="4273203589"/>
+                  </a:ext>
+                </a:extLst>
+              </a:tr>
+              <a:tr h="736704">
+                <a:tc>
+                  <a:txBody>
+                    <a:bodyPr/>
+                    <a:lstStyle/>
+                    <a:p>
+                      <a:pPr algn="ctr"/>
+                      <a:r>
+                        <a:rPr lang="en-US" sz="3200" dirty="0"/>
+                        <a:t>==</a:t>
+                      </a:r>
+                    </a:p>
+                  </a:txBody>
+                  <a:tcPr anchor="ctr"/>
+                </a:tc>
+                <a:tc>
+                  <a:txBody>
+                    <a:bodyPr/>
+                    <a:lstStyle/>
+                    <a:p>
+                      <a:pPr algn="ctr"/>
+                      <a:r>
+                        <a:rPr lang="en-US" sz="3200" dirty="0"/>
+                        <a:t>Equal to</a:t>
+                      </a:r>
+                    </a:p>
+                  </a:txBody>
+                  <a:tcPr anchor="ctr"/>
+                </a:tc>
+                <a:tc>
+                  <a:txBody>
+                    <a:bodyPr/>
+                    <a:lstStyle/>
+                    <a:p>
+                      <a:r>
+                        <a:rPr lang="en-US" dirty="0">
+                          <a:latin typeface="Courier New" panose="02070309020205020404" pitchFamily="49" charset="0"/>
+                          <a:cs typeface="Courier New" panose="02070309020205020404" pitchFamily="49" charset="0"/>
+                        </a:rPr>
+                        <a:t>True: 4 == 4</a:t>
+                      </a:r>
+                    </a:p>
+                    <a:p>
+                      <a:r>
+                        <a:rPr lang="en-US" dirty="0">
+                          <a:latin typeface="Courier New" panose="02070309020205020404" pitchFamily="49" charset="0"/>
+                          <a:cs typeface="Courier New" panose="02070309020205020404" pitchFamily="49" charset="0"/>
+                        </a:rPr>
+                        <a:t>False: 4 == 3</a:t>
+                      </a:r>
+                    </a:p>
+                  </a:txBody>
+                  <a:tcPr anchor="ctr"/>
+                </a:tc>
+                <a:extLst>
+                  <a:ext uri="{0D108BD9-81ED-4DB2-BD59-A6C34878D82A}">
+                    <a16:rowId xmlns:a16="http://schemas.microsoft.com/office/drawing/2014/main" val="3198615305"/>
+                  </a:ext>
+                </a:extLst>
+              </a:tr>
+              <a:tr h="736704">
+                <a:tc>
+                  <a:txBody>
+                    <a:bodyPr/>
+                    <a:lstStyle/>
+                    <a:p>
+                      <a:pPr algn="ctr"/>
+                      <a:r>
+                        <a:rPr lang="en-US" sz="3200" dirty="0"/>
+                        <a:t>!=</a:t>
+                      </a:r>
+                    </a:p>
+                  </a:txBody>
+                  <a:tcPr anchor="ctr"/>
+                </a:tc>
+                <a:tc>
+                  <a:txBody>
+                    <a:bodyPr/>
+                    <a:lstStyle/>
+                    <a:p>
+                      <a:pPr algn="ctr"/>
+                      <a:r>
+                        <a:rPr lang="en-US" sz="3200" dirty="0"/>
+                        <a:t>Not equal to</a:t>
+                      </a:r>
+                    </a:p>
+                  </a:txBody>
+                  <a:tcPr anchor="ctr"/>
+                </a:tc>
+                <a:tc>
+                  <a:txBody>
+                    <a:bodyPr/>
+                    <a:lstStyle/>
+                    <a:p>
+                      <a:r>
+                        <a:rPr lang="en-US" dirty="0">
+                          <a:latin typeface="Courier New" panose="02070309020205020404" pitchFamily="49" charset="0"/>
+                          <a:cs typeface="Courier New" panose="02070309020205020404" pitchFamily="49" charset="0"/>
+                        </a:rPr>
+                        <a:t>True: 3.14 != 3</a:t>
+                      </a:r>
+                    </a:p>
+                    <a:p>
+                      <a:r>
+                        <a:rPr lang="en-US" dirty="0">
+                          <a:latin typeface="Courier New" panose="02070309020205020404" pitchFamily="49" charset="0"/>
+                          <a:cs typeface="Courier New" panose="02070309020205020404" pitchFamily="49" charset="0"/>
+                        </a:rPr>
+                        <a:t>False: 1 != 1</a:t>
+                      </a:r>
+                    </a:p>
+                  </a:txBody>
+                  <a:tcPr anchor="ctr"/>
+                </a:tc>
+                <a:extLst>
+                  <a:ext uri="{0D108BD9-81ED-4DB2-BD59-A6C34878D82A}">
+                    <a16:rowId xmlns:a16="http://schemas.microsoft.com/office/drawing/2014/main" val="1066158608"/>
+                  </a:ext>
+                </a:extLst>
+              </a:tr>
+              <a:tr h="736704">
+                <a:tc>
+                  <a:txBody>
+                    <a:bodyPr/>
+                    <a:lstStyle/>
+                    <a:p>
+                      <a:pPr algn="ctr"/>
+                      <a:r>
+                        <a:rPr lang="en-US" sz="3200" dirty="0"/>
+                        <a:t>!()</a:t>
+                      </a:r>
+                    </a:p>
+                  </a:txBody>
+                  <a:tcPr anchor="ctr"/>
+                </a:tc>
+                <a:tc>
+                  <a:txBody>
+                    <a:bodyPr/>
+                    <a:lstStyle/>
+                    <a:p>
+                      <a:pPr algn="ctr"/>
+                      <a:r>
+                        <a:rPr lang="en-US" sz="3200" dirty="0"/>
+                        <a:t>Not operator</a:t>
+                      </a:r>
+                    </a:p>
+                  </a:txBody>
+                  <a:tcPr anchor="ctr"/>
+                </a:tc>
+                <a:tc>
+                  <a:txBody>
+                    <a:bodyPr/>
+                    <a:lstStyle/>
+                    <a:p>
+                      <a:r>
+                        <a:rPr lang="en-US" dirty="0">
+                          <a:latin typeface="Courier New" panose="02070309020205020404" pitchFamily="49" charset="0"/>
+                          <a:cs typeface="Courier New" panose="02070309020205020404" pitchFamily="49" charset="0"/>
+                        </a:rPr>
+                        <a:t>True: !(False)</a:t>
+                      </a:r>
+                    </a:p>
+                    <a:p>
+                      <a:r>
+                        <a:rPr lang="en-US" dirty="0">
+                          <a:latin typeface="Courier New" panose="02070309020205020404" pitchFamily="49" charset="0"/>
+                          <a:cs typeface="Courier New" panose="02070309020205020404" pitchFamily="49" charset="0"/>
+                        </a:rPr>
+                        <a:t>False: !(True)</a:t>
+                      </a:r>
+                    </a:p>
+                  </a:txBody>
+                  <a:tcPr anchor="ctr"/>
+                </a:tc>
+                <a:extLst>
+                  <a:ext uri="{0D108BD9-81ED-4DB2-BD59-A6C34878D82A}">
+                    <a16:rowId xmlns:a16="http://schemas.microsoft.com/office/drawing/2014/main" val="101864539"/>
+                  </a:ext>
+                </a:extLst>
+              </a:tr>
+            </a:tbl>
+          </a:graphicData>
+        </a:graphic>
+      </p:graphicFrame>
     </p:spTree>
     <p:extLst>
       <p:ext uri="{BB962C8B-B14F-4D97-AF65-F5344CB8AC3E}">
-        <p14:creationId xmlns:p14="http://schemas.microsoft.com/office/powerpoint/2010/main" val="2306049985"/>
+        <p14:creationId xmlns:p14="http://schemas.microsoft.com/office/powerpoint/2010/main" val="2183162242"/>
       </p:ext>
     </p:extLst>
   </p:cSld>
@@ -3798,10 +4039,10 @@
       </p:grpSpPr>
       <p:sp>
         <p:nvSpPr>
-          <p:cNvPr id="4" name="Title 3">
+          <p:cNvPr id="2" name="Title 1">
             <a:extLst>
               <a:ext uri="{FF2B5EF4-FFF2-40B4-BE49-F238E27FC236}">
-                <a16:creationId xmlns:a16="http://schemas.microsoft.com/office/drawing/2014/main" id="{F99A30FB-D816-4C86-82E6-5A577028B017}"/>
+                <a16:creationId xmlns:a16="http://schemas.microsoft.com/office/drawing/2014/main" id="{7219A49C-C84C-4DB4-945B-D28F21D3ADD0}"/>
               </a:ext>
             </a:extLst>
           </p:cNvPr>
@@ -3819,17 +4060,17 @@
           <a:p>
             <a:r>
               <a:rPr lang="en-US" dirty="0"/>
-              <a:t>Mouse Buttons</a:t>
-            </a:r>
-          </a:p>
-        </p:txBody>
-      </p:sp>
-      <p:sp>
-        <p:nvSpPr>
-          <p:cNvPr id="5" name="Content Placeholder 4">
+              <a:t>5. Basic Input</a:t>
+            </a:r>
+          </a:p>
+        </p:txBody>
+      </p:sp>
+      <p:sp>
+        <p:nvSpPr>
+          <p:cNvPr id="3" name="Text Placeholder 2">
             <a:extLst>
               <a:ext uri="{FF2B5EF4-FFF2-40B4-BE49-F238E27FC236}">
-                <a16:creationId xmlns:a16="http://schemas.microsoft.com/office/drawing/2014/main" id="{40F752F7-B9ED-4C62-99E4-F1C904E8BB54}"/>
+                <a16:creationId xmlns:a16="http://schemas.microsoft.com/office/drawing/2014/main" id="{3B86CDA2-336B-4432-BC8D-9E5E184E7396}"/>
               </a:ext>
             </a:extLst>
           </p:cNvPr>
@@ -3837,22 +4078,25 @@
             <a:spLocks noGrp="1"/>
           </p:cNvSpPr>
           <p:nvPr>
-            <p:ph idx="1"/>
-          </p:nvPr>
-        </p:nvSpPr>
-        <p:spPr/>
-        <p:txBody>
-          <a:bodyPr/>
-          <a:lstStyle/>
-          <a:p>
-            <a:endParaRPr lang="en-US" dirty="0"/>
+            <p:ph type="body" idx="1"/>
+          </p:nvPr>
+        </p:nvSpPr>
+        <p:spPr/>
+        <p:txBody>
+          <a:bodyPr/>
+          <a:lstStyle/>
+          <a:p>
+            <a:r>
+              <a:rPr lang="en-US" dirty="0"/>
+              <a:t>Input events</a:t>
+            </a:r>
           </a:p>
         </p:txBody>
       </p:sp>
     </p:spTree>
     <p:extLst>
       <p:ext uri="{BB962C8B-B14F-4D97-AF65-F5344CB8AC3E}">
-        <p14:creationId xmlns:p14="http://schemas.microsoft.com/office/powerpoint/2010/main" val="103471071"/>
+        <p14:creationId xmlns:p14="http://schemas.microsoft.com/office/powerpoint/2010/main" val="1321457643"/>
       </p:ext>
     </p:extLst>
   </p:cSld>
@@ -3863,6 +4107,742 @@
 </file>
 
 <file path=ppt/slides/slide17.xml><?xml version="1.0" encoding="utf-8"?>
+<p:sld xmlns:a="http://schemas.openxmlformats.org/drawingml/2006/main" xmlns:r="http://schemas.openxmlformats.org/officeDocument/2006/relationships" xmlns:p="http://schemas.openxmlformats.org/presentationml/2006/main">
+  <p:cSld>
+    <p:spTree>
+      <p:nvGrpSpPr>
+        <p:cNvPr id="1" name=""/>
+        <p:cNvGrpSpPr/>
+        <p:nvPr/>
+      </p:nvGrpSpPr>
+      <p:grpSpPr>
+        <a:xfrm>
+          <a:off x="0" y="0"/>
+          <a:ext cx="0" cy="0"/>
+          <a:chOff x="0" y="0"/>
+          <a:chExt cx="0" cy="0"/>
+        </a:xfrm>
+      </p:grpSpPr>
+      <p:sp>
+        <p:nvSpPr>
+          <p:cNvPr id="2" name="Title 1">
+            <a:extLst>
+              <a:ext uri="{FF2B5EF4-FFF2-40B4-BE49-F238E27FC236}">
+                <a16:creationId xmlns:a16="http://schemas.microsoft.com/office/drawing/2014/main" id="{5D55DD6D-A7FF-4700-A96E-0C61FD4A99CF}"/>
+              </a:ext>
+            </a:extLst>
+          </p:cNvPr>
+          <p:cNvSpPr>
+            <a:spLocks noGrp="1"/>
+          </p:cNvSpPr>
+          <p:nvPr>
+            <p:ph type="title"/>
+          </p:nvPr>
+        </p:nvSpPr>
+        <p:spPr/>
+        <p:txBody>
+          <a:bodyPr/>
+          <a:lstStyle/>
+          <a:p>
+            <a:r>
+              <a:rPr lang="en-US" dirty="0"/>
+              <a:t>Numbers that Change</a:t>
+            </a:r>
+          </a:p>
+        </p:txBody>
+      </p:sp>
+      <p:sp>
+        <p:nvSpPr>
+          <p:cNvPr id="7" name="Content Placeholder 6">
+            <a:extLst>
+              <a:ext uri="{FF2B5EF4-FFF2-40B4-BE49-F238E27FC236}">
+                <a16:creationId xmlns:a16="http://schemas.microsoft.com/office/drawing/2014/main" id="{7267FC95-1A6A-4B7C-8BD0-3D9A3E9D0012}"/>
+              </a:ext>
+            </a:extLst>
+          </p:cNvPr>
+          <p:cNvSpPr>
+            <a:spLocks noGrp="1"/>
+          </p:cNvSpPr>
+          <p:nvPr>
+            <p:ph idx="1"/>
+          </p:nvPr>
+        </p:nvSpPr>
+        <p:spPr/>
+        <p:txBody>
+          <a:bodyPr/>
+          <a:lstStyle/>
+          <a:p>
+            <a:r>
+              <a:rPr lang="en-US" dirty="0"/>
+              <a:t>Using a label instead of a number</a:t>
+            </a:r>
+          </a:p>
+          <a:p>
+            <a:r>
+              <a:rPr lang="en-US" dirty="0"/>
+              <a:t>A label that represents the same value, but that value can change at any time</a:t>
+            </a:r>
+          </a:p>
+          <a:p>
+            <a:r>
+              <a:rPr lang="en-US" dirty="0"/>
+              <a:t>We call these </a:t>
+            </a:r>
+            <a:r>
+              <a:rPr lang="en-US" b="1" dirty="0"/>
+              <a:t>variables</a:t>
+            </a:r>
+          </a:p>
+        </p:txBody>
+      </p:sp>
+    </p:spTree>
+    <p:extLst>
+      <p:ext uri="{BB962C8B-B14F-4D97-AF65-F5344CB8AC3E}">
+        <p14:creationId xmlns:p14="http://schemas.microsoft.com/office/powerpoint/2010/main" val="2234409147"/>
+      </p:ext>
+    </p:extLst>
+  </p:cSld>
+  <p:clrMapOvr>
+    <a:masterClrMapping/>
+  </p:clrMapOvr>
+</p:sld>
+</file>
+
+<file path=ppt/slides/slide18.xml><?xml version="1.0" encoding="utf-8"?>
+<p:sld xmlns:a="http://schemas.openxmlformats.org/drawingml/2006/main" xmlns:r="http://schemas.openxmlformats.org/officeDocument/2006/relationships" xmlns:p="http://schemas.openxmlformats.org/presentationml/2006/main">
+  <p:cSld>
+    <p:spTree>
+      <p:nvGrpSpPr>
+        <p:cNvPr id="1" name=""/>
+        <p:cNvGrpSpPr/>
+        <p:nvPr/>
+      </p:nvGrpSpPr>
+      <p:grpSpPr>
+        <a:xfrm>
+          <a:off x="0" y="0"/>
+          <a:ext cx="0" cy="0"/>
+          <a:chOff x="0" y="0"/>
+          <a:chExt cx="0" cy="0"/>
+        </a:xfrm>
+      </p:grpSpPr>
+      <p:sp>
+        <p:nvSpPr>
+          <p:cNvPr id="2" name="Title 1">
+            <a:extLst>
+              <a:ext uri="{FF2B5EF4-FFF2-40B4-BE49-F238E27FC236}">
+                <a16:creationId xmlns:a16="http://schemas.microsoft.com/office/drawing/2014/main" id="{3EF4EDC9-B8FE-470C-8FC2-84BDA426BCF5}"/>
+              </a:ext>
+            </a:extLst>
+          </p:cNvPr>
+          <p:cNvSpPr>
+            <a:spLocks noGrp="1"/>
+          </p:cNvSpPr>
+          <p:nvPr>
+            <p:ph type="title"/>
+          </p:nvPr>
+        </p:nvSpPr>
+        <p:spPr/>
+        <p:txBody>
+          <a:bodyPr/>
+          <a:lstStyle/>
+          <a:p>
+            <a:r>
+              <a:rPr lang="en-US" dirty="0"/>
+              <a:t>p5.js Numbers That Change</a:t>
+            </a:r>
+          </a:p>
+        </p:txBody>
+      </p:sp>
+      <p:sp>
+        <p:nvSpPr>
+          <p:cNvPr id="3" name="Content Placeholder 2">
+            <a:extLst>
+              <a:ext uri="{FF2B5EF4-FFF2-40B4-BE49-F238E27FC236}">
+                <a16:creationId xmlns:a16="http://schemas.microsoft.com/office/drawing/2014/main" id="{C0648A3E-263E-4C09-AEF4-6E391AD1DF7B}"/>
+              </a:ext>
+            </a:extLst>
+          </p:cNvPr>
+          <p:cNvSpPr>
+            <a:spLocks noGrp="1"/>
+          </p:cNvSpPr>
+          <p:nvPr>
+            <p:ph idx="1"/>
+          </p:nvPr>
+        </p:nvSpPr>
+        <p:spPr/>
+        <p:txBody>
+          <a:bodyPr/>
+          <a:lstStyle/>
+          <a:p>
+            <a:r>
+              <a:rPr lang="en-US" dirty="0"/>
+              <a:t>Think of </a:t>
+            </a:r>
+            <a:r>
+              <a:rPr lang="en-US" i="1" dirty="0"/>
+              <a:t>fill</a:t>
+            </a:r>
+            <a:r>
+              <a:rPr lang="en-US" dirty="0"/>
+              <a:t> and </a:t>
+            </a:r>
+            <a:r>
+              <a:rPr lang="en-US" i="1" dirty="0"/>
+              <a:t>stroke</a:t>
+            </a:r>
+            <a:r>
+              <a:rPr lang="en-US" dirty="0"/>
+              <a:t> variables</a:t>
+            </a:r>
+          </a:p>
+          <a:p>
+            <a:endParaRPr lang="en-US" dirty="0"/>
+          </a:p>
+          <a:p>
+            <a:r>
+              <a:rPr lang="en-US" b="1" dirty="0"/>
+              <a:t>width</a:t>
+            </a:r>
+            <a:r>
+              <a:rPr lang="en-US" dirty="0"/>
+              <a:t> and </a:t>
+            </a:r>
+            <a:r>
+              <a:rPr lang="en-US" b="1" dirty="0"/>
+              <a:t>height</a:t>
+            </a:r>
+          </a:p>
+          <a:p>
+            <a:endParaRPr lang="en-US" dirty="0"/>
+          </a:p>
+          <a:p>
+            <a:r>
+              <a:rPr lang="en-US" b="1" dirty="0" err="1"/>
+              <a:t>mouseX</a:t>
+            </a:r>
+            <a:r>
+              <a:rPr lang="en-US" dirty="0"/>
+              <a:t> will always be the horizontal position of the cursor</a:t>
+            </a:r>
+          </a:p>
+          <a:p>
+            <a:pPr lvl="1"/>
+            <a:r>
+              <a:rPr lang="en-US" dirty="0"/>
+              <a:t>Number of pixels between the cursor and the left edge</a:t>
+            </a:r>
+          </a:p>
+          <a:p>
+            <a:pPr lvl="1"/>
+            <a:endParaRPr lang="en-US" dirty="0"/>
+          </a:p>
+          <a:p>
+            <a:r>
+              <a:rPr lang="en-US" b="1" dirty="0" err="1"/>
+              <a:t>mouseY</a:t>
+            </a:r>
+            <a:r>
+              <a:rPr lang="en-US" dirty="0"/>
+              <a:t> is the vertical position of the cursor</a:t>
+            </a:r>
+          </a:p>
+          <a:p>
+            <a:pPr lvl="1"/>
+            <a:r>
+              <a:rPr lang="en-US" dirty="0"/>
+              <a:t>Number of pixels between the cursor and the top edge</a:t>
+            </a:r>
+          </a:p>
+        </p:txBody>
+      </p:sp>
+    </p:spTree>
+    <p:extLst>
+      <p:ext uri="{BB962C8B-B14F-4D97-AF65-F5344CB8AC3E}">
+        <p14:creationId xmlns:p14="http://schemas.microsoft.com/office/powerpoint/2010/main" val="2676496591"/>
+      </p:ext>
+    </p:extLst>
+  </p:cSld>
+  <p:clrMapOvr>
+    <a:masterClrMapping/>
+  </p:clrMapOvr>
+</p:sld>
+</file>
+
+<file path=ppt/slides/slide19.xml><?xml version="1.0" encoding="utf-8"?>
+<p:sld xmlns:a="http://schemas.openxmlformats.org/drawingml/2006/main" xmlns:r="http://schemas.openxmlformats.org/officeDocument/2006/relationships" xmlns:p="http://schemas.openxmlformats.org/presentationml/2006/main">
+  <p:cSld>
+    <p:spTree>
+      <p:nvGrpSpPr>
+        <p:cNvPr id="1" name=""/>
+        <p:cNvGrpSpPr/>
+        <p:nvPr/>
+      </p:nvGrpSpPr>
+      <p:grpSpPr>
+        <a:xfrm>
+          <a:off x="0" y="0"/>
+          <a:ext cx="0" cy="0"/>
+          <a:chOff x="0" y="0"/>
+          <a:chExt cx="0" cy="0"/>
+        </a:xfrm>
+      </p:grpSpPr>
+      <p:sp>
+        <p:nvSpPr>
+          <p:cNvPr id="2" name="Title 1">
+            <a:extLst>
+              <a:ext uri="{FF2B5EF4-FFF2-40B4-BE49-F238E27FC236}">
+                <a16:creationId xmlns:a16="http://schemas.microsoft.com/office/drawing/2014/main" id="{4B837910-E2B0-421C-95E9-0BAAF61D7141}"/>
+              </a:ext>
+            </a:extLst>
+          </p:cNvPr>
+          <p:cNvSpPr>
+            <a:spLocks noGrp="1"/>
+          </p:cNvSpPr>
+          <p:nvPr>
+            <p:ph type="title"/>
+          </p:nvPr>
+        </p:nvSpPr>
+        <p:spPr/>
+        <p:txBody>
+          <a:bodyPr/>
+          <a:lstStyle/>
+          <a:p>
+            <a:r>
+              <a:rPr lang="en-US" dirty="0"/>
+              <a:t>5.2 Input Events</a:t>
+            </a:r>
+          </a:p>
+        </p:txBody>
+      </p:sp>
+      <p:sp>
+        <p:nvSpPr>
+          <p:cNvPr id="3" name="Text Placeholder 2">
+            <a:extLst>
+              <a:ext uri="{FF2B5EF4-FFF2-40B4-BE49-F238E27FC236}">
+                <a16:creationId xmlns:a16="http://schemas.microsoft.com/office/drawing/2014/main" id="{EC7F4DCD-9D67-4AA6-A995-C7C30AC9243D}"/>
+              </a:ext>
+            </a:extLst>
+          </p:cNvPr>
+          <p:cNvSpPr>
+            <a:spLocks noGrp="1"/>
+          </p:cNvSpPr>
+          <p:nvPr>
+            <p:ph type="body" idx="1"/>
+          </p:nvPr>
+        </p:nvSpPr>
+        <p:spPr/>
+        <p:txBody>
+          <a:bodyPr/>
+          <a:lstStyle/>
+          <a:p>
+            <a:endParaRPr lang="en-US"/>
+          </a:p>
+        </p:txBody>
+      </p:sp>
+    </p:spTree>
+    <p:extLst>
+      <p:ext uri="{BB962C8B-B14F-4D97-AF65-F5344CB8AC3E}">
+        <p14:creationId xmlns:p14="http://schemas.microsoft.com/office/powerpoint/2010/main" val="1465082787"/>
+      </p:ext>
+    </p:extLst>
+  </p:cSld>
+  <p:clrMapOvr>
+    <a:masterClrMapping/>
+  </p:clrMapOvr>
+</p:sld>
+</file>
+
+<file path=ppt/slides/slide2.xml><?xml version="1.0" encoding="utf-8"?>
+<p:sld xmlns:a="http://schemas.openxmlformats.org/drawingml/2006/main" xmlns:r="http://schemas.openxmlformats.org/officeDocument/2006/relationships" xmlns:p="http://schemas.openxmlformats.org/presentationml/2006/main">
+  <p:cSld>
+    <p:spTree>
+      <p:nvGrpSpPr>
+        <p:cNvPr id="1" name=""/>
+        <p:cNvGrpSpPr/>
+        <p:nvPr/>
+      </p:nvGrpSpPr>
+      <p:grpSpPr>
+        <a:xfrm>
+          <a:off x="0" y="0"/>
+          <a:ext cx="0" cy="0"/>
+          <a:chOff x="0" y="0"/>
+          <a:chExt cx="0" cy="0"/>
+        </a:xfrm>
+      </p:grpSpPr>
+      <p:sp>
+        <p:nvSpPr>
+          <p:cNvPr id="2" name="Title 1">
+            <a:extLst>
+              <a:ext uri="{FF2B5EF4-FFF2-40B4-BE49-F238E27FC236}">
+                <a16:creationId xmlns:a16="http://schemas.microsoft.com/office/drawing/2014/main" id="{236B145B-1E23-466B-82F2-D6B3CF6AFAD6}"/>
+              </a:ext>
+            </a:extLst>
+          </p:cNvPr>
+          <p:cNvSpPr>
+            <a:spLocks noGrp="1"/>
+          </p:cNvSpPr>
+          <p:nvPr>
+            <p:ph type="title"/>
+          </p:nvPr>
+        </p:nvSpPr>
+        <p:spPr/>
+        <p:txBody>
+          <a:bodyPr/>
+          <a:lstStyle/>
+          <a:p>
+            <a:r>
+              <a:rPr lang="en-US" dirty="0"/>
+              <a:t>Previously, in IMM120</a:t>
+            </a:r>
+          </a:p>
+        </p:txBody>
+      </p:sp>
+      <p:sp>
+        <p:nvSpPr>
+          <p:cNvPr id="3" name="Content Placeholder 2">
+            <a:extLst>
+              <a:ext uri="{FF2B5EF4-FFF2-40B4-BE49-F238E27FC236}">
+                <a16:creationId xmlns:a16="http://schemas.microsoft.com/office/drawing/2014/main" id="{EEA18AB6-8469-4AB3-B1C1-239F870BBA6F}"/>
+              </a:ext>
+            </a:extLst>
+          </p:cNvPr>
+          <p:cNvSpPr>
+            <a:spLocks noGrp="1"/>
+          </p:cNvSpPr>
+          <p:nvPr>
+            <p:ph idx="1"/>
+          </p:nvPr>
+        </p:nvSpPr>
+        <p:spPr/>
+        <p:txBody>
+          <a:bodyPr/>
+          <a:lstStyle/>
+          <a:p>
+            <a:r>
+              <a:rPr lang="en-US" i="1" dirty="0"/>
+              <a:t>Where is Professor Hallberg’s office?</a:t>
+            </a:r>
+          </a:p>
+          <a:p>
+            <a:pPr lvl="1"/>
+            <a:r>
+              <a:rPr lang="en-US" dirty="0"/>
+              <a:t>Adjunct office: 3</a:t>
+            </a:r>
+            <a:r>
+              <a:rPr lang="en-US" baseline="30000" dirty="0"/>
+              <a:t>rd</a:t>
+            </a:r>
+            <a:r>
+              <a:rPr lang="en-US" dirty="0"/>
+              <a:t> floor, right at the end of the hall.</a:t>
+            </a:r>
+          </a:p>
+          <a:p>
+            <a:pPr lvl="1"/>
+            <a:endParaRPr lang="en-US" dirty="0"/>
+          </a:p>
+          <a:p>
+            <a:r>
+              <a:rPr lang="en-US" i="1" dirty="0"/>
+              <a:t>When are Professor Hallberg’s office hours?</a:t>
+            </a:r>
+          </a:p>
+          <a:p>
+            <a:pPr lvl="1"/>
+            <a:r>
+              <a:rPr lang="en-US" dirty="0"/>
+              <a:t>All day Monday from 10am until class.</a:t>
+            </a:r>
+          </a:p>
+          <a:p>
+            <a:pPr lvl="1"/>
+            <a:endParaRPr lang="en-US" dirty="0"/>
+          </a:p>
+          <a:p>
+            <a:r>
+              <a:rPr lang="en-US" i="1" dirty="0"/>
+              <a:t>What three Canvas features do you find most useful?</a:t>
+            </a:r>
+          </a:p>
+          <a:p>
+            <a:pPr lvl="1"/>
+            <a:r>
+              <a:rPr lang="en-US" dirty="0"/>
+              <a:t>“First year here… so I haven’t used it much.”</a:t>
+            </a:r>
+          </a:p>
+          <a:p>
+            <a:pPr lvl="1"/>
+            <a:r>
+              <a:rPr lang="en-US" dirty="0"/>
+              <a:t>“I enjoy that there’s an app”</a:t>
+            </a:r>
+          </a:p>
+          <a:p>
+            <a:endParaRPr lang="en-US" dirty="0"/>
+          </a:p>
+        </p:txBody>
+      </p:sp>
+    </p:spTree>
+    <p:extLst>
+      <p:ext uri="{BB962C8B-B14F-4D97-AF65-F5344CB8AC3E}">
+        <p14:creationId xmlns:p14="http://schemas.microsoft.com/office/powerpoint/2010/main" val="2622826793"/>
+      </p:ext>
+    </p:extLst>
+  </p:cSld>
+  <p:clrMapOvr>
+    <a:masterClrMapping/>
+  </p:clrMapOvr>
+</p:sld>
+</file>
+
+<file path=ppt/slides/slide20.xml><?xml version="1.0" encoding="utf-8"?>
+<p:sld xmlns:a="http://schemas.openxmlformats.org/drawingml/2006/main" xmlns:r="http://schemas.openxmlformats.org/officeDocument/2006/relationships" xmlns:p="http://schemas.openxmlformats.org/presentationml/2006/main">
+  <p:cSld>
+    <p:spTree>
+      <p:nvGrpSpPr>
+        <p:cNvPr id="1" name=""/>
+        <p:cNvGrpSpPr/>
+        <p:nvPr/>
+      </p:nvGrpSpPr>
+      <p:grpSpPr>
+        <a:xfrm>
+          <a:off x="0" y="0"/>
+          <a:ext cx="0" cy="0"/>
+          <a:chOff x="0" y="0"/>
+          <a:chExt cx="0" cy="0"/>
+        </a:xfrm>
+      </p:grpSpPr>
+      <p:sp>
+        <p:nvSpPr>
+          <p:cNvPr id="2" name="Title 1">
+            <a:extLst>
+              <a:ext uri="{FF2B5EF4-FFF2-40B4-BE49-F238E27FC236}">
+                <a16:creationId xmlns:a16="http://schemas.microsoft.com/office/drawing/2014/main" id="{06F19199-706C-41E9-A1DD-763BAD27282E}"/>
+              </a:ext>
+            </a:extLst>
+          </p:cNvPr>
+          <p:cNvSpPr>
+            <a:spLocks noGrp="1"/>
+          </p:cNvSpPr>
+          <p:nvPr>
+            <p:ph type="title"/>
+          </p:nvPr>
+        </p:nvSpPr>
+        <p:spPr/>
+        <p:txBody>
+          <a:bodyPr/>
+          <a:lstStyle/>
+          <a:p>
+            <a:r>
+              <a:rPr lang="en-US" dirty="0"/>
+              <a:t>How Does p5.js provide event information?</a:t>
+            </a:r>
+          </a:p>
+        </p:txBody>
+      </p:sp>
+      <p:sp>
+        <p:nvSpPr>
+          <p:cNvPr id="3" name="Text Placeholder 2">
+            <a:extLst>
+              <a:ext uri="{FF2B5EF4-FFF2-40B4-BE49-F238E27FC236}">
+                <a16:creationId xmlns:a16="http://schemas.microsoft.com/office/drawing/2014/main" id="{D7B9D9D1-C918-44B2-B38D-41CA0CE1D195}"/>
+              </a:ext>
+            </a:extLst>
+          </p:cNvPr>
+          <p:cNvSpPr>
+            <a:spLocks noGrp="1"/>
+          </p:cNvSpPr>
+          <p:nvPr>
+            <p:ph type="body" idx="1"/>
+          </p:nvPr>
+        </p:nvSpPr>
+        <p:spPr/>
+        <p:txBody>
+          <a:bodyPr/>
+          <a:lstStyle/>
+          <a:p>
+            <a:r>
+              <a:rPr lang="en-US" dirty="0"/>
+              <a:t>Boolean Variables</a:t>
+            </a:r>
+          </a:p>
+        </p:txBody>
+      </p:sp>
+      <p:sp>
+        <p:nvSpPr>
+          <p:cNvPr id="4" name="Content Placeholder 3">
+            <a:extLst>
+              <a:ext uri="{FF2B5EF4-FFF2-40B4-BE49-F238E27FC236}">
+                <a16:creationId xmlns:a16="http://schemas.microsoft.com/office/drawing/2014/main" id="{6E8D5644-6E8D-4E9F-AF38-C06F27676F60}"/>
+              </a:ext>
+            </a:extLst>
+          </p:cNvPr>
+          <p:cNvSpPr>
+            <a:spLocks noGrp="1"/>
+          </p:cNvSpPr>
+          <p:nvPr>
+            <p:ph sz="half" idx="2"/>
+          </p:nvPr>
+        </p:nvSpPr>
+        <p:spPr/>
+        <p:txBody>
+          <a:bodyPr/>
+          <a:lstStyle/>
+          <a:p>
+            <a:r>
+              <a:rPr lang="en-US" dirty="0" err="1">
+                <a:latin typeface="Courier New" panose="02070309020205020404" pitchFamily="49" charset="0"/>
+                <a:cs typeface="Courier New" panose="02070309020205020404" pitchFamily="49" charset="0"/>
+              </a:rPr>
+              <a:t>mouseIsPressed</a:t>
+            </a:r>
+            <a:endParaRPr lang="en-US" dirty="0">
+              <a:latin typeface="Courier New" panose="02070309020205020404" pitchFamily="49" charset="0"/>
+              <a:cs typeface="Courier New" panose="02070309020205020404" pitchFamily="49" charset="0"/>
+            </a:endParaRPr>
+          </a:p>
+          <a:p>
+            <a:r>
+              <a:rPr lang="en-US" dirty="0" err="1">
+                <a:latin typeface="Courier New" panose="02070309020205020404" pitchFamily="49" charset="0"/>
+                <a:cs typeface="Courier New" panose="02070309020205020404" pitchFamily="49" charset="0"/>
+              </a:rPr>
+              <a:t>keyIsPressed</a:t>
+            </a:r>
+            <a:endParaRPr lang="en-US" dirty="0">
+              <a:latin typeface="Courier New" panose="02070309020205020404" pitchFamily="49" charset="0"/>
+              <a:cs typeface="Courier New" panose="02070309020205020404" pitchFamily="49" charset="0"/>
+            </a:endParaRPr>
+          </a:p>
+          <a:p>
+            <a:endParaRPr lang="en-US" dirty="0">
+              <a:latin typeface="Courier New" panose="02070309020205020404" pitchFamily="49" charset="0"/>
+              <a:cs typeface="Courier New" panose="02070309020205020404" pitchFamily="49" charset="0"/>
+            </a:endParaRPr>
+          </a:p>
+        </p:txBody>
+      </p:sp>
+      <p:sp>
+        <p:nvSpPr>
+          <p:cNvPr id="5" name="Text Placeholder 4">
+            <a:extLst>
+              <a:ext uri="{FF2B5EF4-FFF2-40B4-BE49-F238E27FC236}">
+                <a16:creationId xmlns:a16="http://schemas.microsoft.com/office/drawing/2014/main" id="{C74ED259-B657-4C61-A2C4-3D9FD1FD35CB}"/>
+              </a:ext>
+            </a:extLst>
+          </p:cNvPr>
+          <p:cNvSpPr>
+            <a:spLocks noGrp="1"/>
+          </p:cNvSpPr>
+          <p:nvPr>
+            <p:ph type="body" sz="quarter" idx="3"/>
+          </p:nvPr>
+        </p:nvSpPr>
+        <p:spPr>
+          <a:xfrm>
+            <a:off x="5683348" y="1681163"/>
+            <a:ext cx="5672040" cy="823912"/>
+          </a:xfrm>
+        </p:spPr>
+        <p:txBody>
+          <a:bodyPr/>
+          <a:lstStyle/>
+          <a:p>
+            <a:r>
+              <a:rPr lang="en-US" dirty="0"/>
+              <a:t>Event Functions</a:t>
+            </a:r>
+          </a:p>
+        </p:txBody>
+      </p:sp>
+      <p:sp>
+        <p:nvSpPr>
+          <p:cNvPr id="6" name="Content Placeholder 5">
+            <a:extLst>
+              <a:ext uri="{FF2B5EF4-FFF2-40B4-BE49-F238E27FC236}">
+                <a16:creationId xmlns:a16="http://schemas.microsoft.com/office/drawing/2014/main" id="{92FBA8AD-05BE-48E6-8246-123F8B1441E3}"/>
+              </a:ext>
+            </a:extLst>
+          </p:cNvPr>
+          <p:cNvSpPr>
+            <a:spLocks noGrp="1"/>
+          </p:cNvSpPr>
+          <p:nvPr>
+            <p:ph sz="quarter" idx="4"/>
+          </p:nvPr>
+        </p:nvSpPr>
+        <p:spPr>
+          <a:xfrm>
+            <a:off x="5683348" y="2505075"/>
+            <a:ext cx="6372664" cy="3684588"/>
+          </a:xfrm>
+        </p:spPr>
+        <p:txBody>
+          <a:bodyPr/>
+          <a:lstStyle/>
+          <a:p>
+            <a:r>
+              <a:rPr lang="en-US" dirty="0">
+                <a:latin typeface="Courier New" panose="02070309020205020404" pitchFamily="49" charset="0"/>
+                <a:cs typeface="Courier New" panose="02070309020205020404" pitchFamily="49" charset="0"/>
+              </a:rPr>
+              <a:t>function </a:t>
+            </a:r>
+            <a:r>
+              <a:rPr lang="en-US" dirty="0" err="1">
+                <a:latin typeface="Courier New" panose="02070309020205020404" pitchFamily="49" charset="0"/>
+                <a:cs typeface="Courier New" panose="02070309020205020404" pitchFamily="49" charset="0"/>
+              </a:rPr>
+              <a:t>mousePressed</a:t>
+            </a:r>
+            <a:r>
+              <a:rPr lang="en-US" dirty="0">
+                <a:latin typeface="Courier New" panose="02070309020205020404" pitchFamily="49" charset="0"/>
+                <a:cs typeface="Courier New" panose="02070309020205020404" pitchFamily="49" charset="0"/>
+              </a:rPr>
+              <a:t>() { }</a:t>
+            </a:r>
+          </a:p>
+          <a:p>
+            <a:r>
+              <a:rPr lang="en-US" dirty="0">
+                <a:latin typeface="Courier New" panose="02070309020205020404" pitchFamily="49" charset="0"/>
+                <a:cs typeface="Courier New" panose="02070309020205020404" pitchFamily="49" charset="0"/>
+              </a:rPr>
+              <a:t>function </a:t>
+            </a:r>
+            <a:r>
+              <a:rPr lang="en-US" dirty="0" err="1">
+                <a:latin typeface="Courier New" panose="02070309020205020404" pitchFamily="49" charset="0"/>
+                <a:cs typeface="Courier New" panose="02070309020205020404" pitchFamily="49" charset="0"/>
+              </a:rPr>
+              <a:t>keyPressed</a:t>
+            </a:r>
+            <a:r>
+              <a:rPr lang="en-US" dirty="0">
+                <a:latin typeface="Courier New" panose="02070309020205020404" pitchFamily="49" charset="0"/>
+                <a:cs typeface="Courier New" panose="02070309020205020404" pitchFamily="49" charset="0"/>
+              </a:rPr>
+              <a:t>() { }</a:t>
+            </a:r>
+          </a:p>
+        </p:txBody>
+      </p:sp>
+    </p:spTree>
+    <p:extLst>
+      <p:ext uri="{BB962C8B-B14F-4D97-AF65-F5344CB8AC3E}">
+        <p14:creationId xmlns:p14="http://schemas.microsoft.com/office/powerpoint/2010/main" val="2306049985"/>
+      </p:ext>
+    </p:extLst>
+  </p:cSld>
+  <p:clrMapOvr>
+    <a:masterClrMapping/>
+  </p:clrMapOvr>
+</p:sld>
+</file>
+
+<file path=ppt/slides/slide21.xml><?xml version="1.0" encoding="utf-8"?>
 <p:sld xmlns:a="http://schemas.openxmlformats.org/drawingml/2006/main" xmlns:r="http://schemas.openxmlformats.org/officeDocument/2006/relationships" xmlns:p="http://schemas.openxmlformats.org/presentationml/2006/main">
   <p:cSld>
     <p:spTree>
@@ -3969,7 +4949,7 @@
 </p:sld>
 </file>
 
-<file path=ppt/slides/slide2.xml><?xml version="1.0" encoding="utf-8"?>
+<file path=ppt/slides/slide22.xml><?xml version="1.0" encoding="utf-8"?>
 <p:sld xmlns:a="http://schemas.openxmlformats.org/drawingml/2006/main" xmlns:r="http://schemas.openxmlformats.org/officeDocument/2006/relationships" xmlns:p="http://schemas.openxmlformats.org/presentationml/2006/main">
   <p:cSld>
     <p:spTree>
@@ -3991,7 +4971,7 @@
           <p:cNvPr id="2" name="Title 1">
             <a:extLst>
               <a:ext uri="{FF2B5EF4-FFF2-40B4-BE49-F238E27FC236}">
-                <a16:creationId xmlns:a16="http://schemas.microsoft.com/office/drawing/2014/main" id="{236B145B-1E23-466B-82F2-D6B3CF6AFAD6}"/>
+                <a16:creationId xmlns:a16="http://schemas.microsoft.com/office/drawing/2014/main" id="{C94FB091-1617-4DA8-9205-4220543E7FE3}"/>
               </a:ext>
             </a:extLst>
           </p:cNvPr>
@@ -4009,7 +4989,542 @@
           <a:p>
             <a:r>
               <a:rPr lang="en-US" dirty="0"/>
-              <a:t>Previously, in IMM120</a:t>
+              <a:t>6. Variables</a:t>
+            </a:r>
+          </a:p>
+        </p:txBody>
+      </p:sp>
+      <p:sp>
+        <p:nvSpPr>
+          <p:cNvPr id="3" name="Text Placeholder 2">
+            <a:extLst>
+              <a:ext uri="{FF2B5EF4-FFF2-40B4-BE49-F238E27FC236}">
+                <a16:creationId xmlns:a16="http://schemas.microsoft.com/office/drawing/2014/main" id="{275CC933-E108-4A95-9757-1D8F069BB95D}"/>
+              </a:ext>
+            </a:extLst>
+          </p:cNvPr>
+          <p:cNvSpPr>
+            <a:spLocks noGrp="1"/>
+          </p:cNvSpPr>
+          <p:nvPr>
+            <p:ph type="body" idx="1"/>
+          </p:nvPr>
+        </p:nvSpPr>
+        <p:spPr/>
+        <p:txBody>
+          <a:bodyPr/>
+          <a:lstStyle/>
+          <a:p>
+            <a:endParaRPr lang="en-US"/>
+          </a:p>
+        </p:txBody>
+      </p:sp>
+    </p:spTree>
+    <p:extLst>
+      <p:ext uri="{BB962C8B-B14F-4D97-AF65-F5344CB8AC3E}">
+        <p14:creationId xmlns:p14="http://schemas.microsoft.com/office/powerpoint/2010/main" val="2456275446"/>
+      </p:ext>
+    </p:extLst>
+  </p:cSld>
+  <p:clrMapOvr>
+    <a:masterClrMapping/>
+  </p:clrMapOvr>
+</p:sld>
+</file>
+
+<file path=ppt/slides/slide23.xml><?xml version="1.0" encoding="utf-8"?>
+<p:sld xmlns:a="http://schemas.openxmlformats.org/drawingml/2006/main" xmlns:r="http://schemas.openxmlformats.org/officeDocument/2006/relationships" xmlns:p="http://schemas.openxmlformats.org/presentationml/2006/main">
+  <p:cSld>
+    <p:spTree>
+      <p:nvGrpSpPr>
+        <p:cNvPr id="1" name=""/>
+        <p:cNvGrpSpPr/>
+        <p:nvPr/>
+      </p:nvGrpSpPr>
+      <p:grpSpPr>
+        <a:xfrm>
+          <a:off x="0" y="0"/>
+          <a:ext cx="0" cy="0"/>
+          <a:chOff x="0" y="0"/>
+          <a:chExt cx="0" cy="0"/>
+        </a:xfrm>
+      </p:grpSpPr>
+      <p:sp>
+        <p:nvSpPr>
+          <p:cNvPr id="2" name="Title 1">
+            <a:extLst>
+              <a:ext uri="{FF2B5EF4-FFF2-40B4-BE49-F238E27FC236}">
+                <a16:creationId xmlns:a16="http://schemas.microsoft.com/office/drawing/2014/main" id="{5D55DD6D-A7FF-4700-A96E-0C61FD4A99CF}"/>
+              </a:ext>
+            </a:extLst>
+          </p:cNvPr>
+          <p:cNvSpPr>
+            <a:spLocks noGrp="1"/>
+          </p:cNvSpPr>
+          <p:nvPr>
+            <p:ph type="title"/>
+          </p:nvPr>
+        </p:nvSpPr>
+        <p:spPr/>
+        <p:txBody>
+          <a:bodyPr/>
+          <a:lstStyle/>
+          <a:p>
+            <a:r>
+              <a:rPr lang="en-US" dirty="0"/>
+              <a:t>Making Your Own Variables</a:t>
+            </a:r>
+          </a:p>
+        </p:txBody>
+      </p:sp>
+      <p:pic>
+        <p:nvPicPr>
+          <p:cNvPr id="5" name="Content Placeholder 4">
+            <a:extLst>
+              <a:ext uri="{FF2B5EF4-FFF2-40B4-BE49-F238E27FC236}">
+                <a16:creationId xmlns:a16="http://schemas.microsoft.com/office/drawing/2014/main" id="{5395BAB3-722F-4237-A16F-890227A965B7}"/>
+              </a:ext>
+            </a:extLst>
+          </p:cNvPr>
+          <p:cNvPicPr>
+            <a:picLocks noGrp="1" noChangeAspect="1"/>
+          </p:cNvPicPr>
+          <p:nvPr>
+            <p:ph idx="1"/>
+          </p:nvPr>
+        </p:nvPicPr>
+        <p:blipFill>
+          <a:blip r:embed="rId2">
+            <a:extLst>
+              <a:ext uri="{28A0092B-C50C-407E-A947-70E740481C1C}">
+                <a14:useLocalDpi xmlns:a14="http://schemas.microsoft.com/office/drawing/2010/main" val="0"/>
+              </a:ext>
+            </a:extLst>
+          </a:blip>
+          <a:stretch>
+            <a:fillRect/>
+          </a:stretch>
+        </p:blipFill>
+        <p:spPr>
+          <a:xfrm>
+            <a:off x="838200" y="2423954"/>
+            <a:ext cx="10515600" cy="3154680"/>
+          </a:xfrm>
+        </p:spPr>
+      </p:pic>
+    </p:spTree>
+    <p:extLst>
+      <p:ext uri="{BB962C8B-B14F-4D97-AF65-F5344CB8AC3E}">
+        <p14:creationId xmlns:p14="http://schemas.microsoft.com/office/powerpoint/2010/main" val="928971801"/>
+      </p:ext>
+    </p:extLst>
+  </p:cSld>
+  <p:clrMapOvr>
+    <a:masterClrMapping/>
+  </p:clrMapOvr>
+</p:sld>
+</file>
+
+<file path=ppt/slides/slide24.xml><?xml version="1.0" encoding="utf-8"?>
+<p:sld xmlns:a="http://schemas.openxmlformats.org/drawingml/2006/main" xmlns:r="http://schemas.openxmlformats.org/officeDocument/2006/relationships" xmlns:p="http://schemas.openxmlformats.org/presentationml/2006/main">
+  <p:cSld>
+    <p:spTree>
+      <p:nvGrpSpPr>
+        <p:cNvPr id="1" name=""/>
+        <p:cNvGrpSpPr/>
+        <p:nvPr/>
+      </p:nvGrpSpPr>
+      <p:grpSpPr>
+        <a:xfrm>
+          <a:off x="0" y="0"/>
+          <a:ext cx="0" cy="0"/>
+          <a:chOff x="0" y="0"/>
+          <a:chExt cx="0" cy="0"/>
+        </a:xfrm>
+      </p:grpSpPr>
+      <p:sp>
+        <p:nvSpPr>
+          <p:cNvPr id="4" name="Title 3">
+            <a:extLst>
+              <a:ext uri="{FF2B5EF4-FFF2-40B4-BE49-F238E27FC236}">
+                <a16:creationId xmlns:a16="http://schemas.microsoft.com/office/drawing/2014/main" id="{40465CE9-8AAA-47AE-A812-5872854D48E9}"/>
+              </a:ext>
+            </a:extLst>
+          </p:cNvPr>
+          <p:cNvSpPr>
+            <a:spLocks noGrp="1"/>
+          </p:cNvSpPr>
+          <p:nvPr>
+            <p:ph type="title"/>
+          </p:nvPr>
+        </p:nvSpPr>
+        <p:spPr/>
+        <p:txBody>
+          <a:bodyPr/>
+          <a:lstStyle/>
+          <a:p>
+            <a:r>
+              <a:rPr lang="en-US" dirty="0"/>
+              <a:t>Saving a Circle</a:t>
+            </a:r>
+          </a:p>
+        </p:txBody>
+      </p:sp>
+      <p:sp>
+        <p:nvSpPr>
+          <p:cNvPr id="5" name="Text Placeholder 4">
+            <a:extLst>
+              <a:ext uri="{FF2B5EF4-FFF2-40B4-BE49-F238E27FC236}">
+                <a16:creationId xmlns:a16="http://schemas.microsoft.com/office/drawing/2014/main" id="{B48123CC-EE0D-4C85-9348-87E0FCCAD8F6}"/>
+              </a:ext>
+            </a:extLst>
+          </p:cNvPr>
+          <p:cNvSpPr>
+            <a:spLocks noGrp="1"/>
+          </p:cNvSpPr>
+          <p:nvPr>
+            <p:ph type="body" idx="1"/>
+          </p:nvPr>
+        </p:nvSpPr>
+        <p:spPr/>
+        <p:txBody>
+          <a:bodyPr/>
+          <a:lstStyle/>
+          <a:p>
+            <a:endParaRPr lang="en-US"/>
+          </a:p>
+        </p:txBody>
+      </p:sp>
+    </p:spTree>
+    <p:extLst>
+      <p:ext uri="{BB962C8B-B14F-4D97-AF65-F5344CB8AC3E}">
+        <p14:creationId xmlns:p14="http://schemas.microsoft.com/office/powerpoint/2010/main" val="2176887869"/>
+      </p:ext>
+    </p:extLst>
+  </p:cSld>
+  <p:clrMapOvr>
+    <a:masterClrMapping/>
+  </p:clrMapOvr>
+</p:sld>
+</file>
+
+<file path=ppt/slides/slide25.xml><?xml version="1.0" encoding="utf-8"?>
+<p:sld xmlns:a="http://schemas.openxmlformats.org/drawingml/2006/main" xmlns:r="http://schemas.openxmlformats.org/officeDocument/2006/relationships" xmlns:p="http://schemas.openxmlformats.org/presentationml/2006/main">
+  <p:cSld>
+    <p:spTree>
+      <p:nvGrpSpPr>
+        <p:cNvPr id="1" name=""/>
+        <p:cNvGrpSpPr/>
+        <p:nvPr/>
+      </p:nvGrpSpPr>
+      <p:grpSpPr>
+        <a:xfrm>
+          <a:off x="0" y="0"/>
+          <a:ext cx="0" cy="0"/>
+          <a:chOff x="0" y="0"/>
+          <a:chExt cx="0" cy="0"/>
+        </a:xfrm>
+      </p:grpSpPr>
+      <p:sp>
+        <p:nvSpPr>
+          <p:cNvPr id="2" name="Title 1">
+            <a:extLst>
+              <a:ext uri="{FF2B5EF4-FFF2-40B4-BE49-F238E27FC236}">
+                <a16:creationId xmlns:a16="http://schemas.microsoft.com/office/drawing/2014/main" id="{8D358F19-F93C-4821-8A82-4A36624BB9CF}"/>
+              </a:ext>
+            </a:extLst>
+          </p:cNvPr>
+          <p:cNvSpPr>
+            <a:spLocks noGrp="1"/>
+          </p:cNvSpPr>
+          <p:nvPr>
+            <p:ph type="title"/>
+          </p:nvPr>
+        </p:nvSpPr>
+        <p:spPr/>
+        <p:txBody>
+          <a:bodyPr/>
+          <a:lstStyle/>
+          <a:p>
+            <a:r>
+              <a:rPr lang="en-US" dirty="0"/>
+              <a:t>Making Things Move</a:t>
+            </a:r>
+          </a:p>
+        </p:txBody>
+      </p:sp>
+      <p:sp>
+        <p:nvSpPr>
+          <p:cNvPr id="3" name="Text Placeholder 2">
+            <a:extLst>
+              <a:ext uri="{FF2B5EF4-FFF2-40B4-BE49-F238E27FC236}">
+                <a16:creationId xmlns:a16="http://schemas.microsoft.com/office/drawing/2014/main" id="{AD0B70FB-00DC-45BD-8ACB-124B41841B51}"/>
+              </a:ext>
+            </a:extLst>
+          </p:cNvPr>
+          <p:cNvSpPr>
+            <a:spLocks noGrp="1"/>
+          </p:cNvSpPr>
+          <p:nvPr>
+            <p:ph type="body" idx="1"/>
+          </p:nvPr>
+        </p:nvSpPr>
+        <p:spPr/>
+        <p:txBody>
+          <a:bodyPr/>
+          <a:lstStyle/>
+          <a:p>
+            <a:endParaRPr lang="en-US"/>
+          </a:p>
+        </p:txBody>
+      </p:sp>
+    </p:spTree>
+    <p:extLst>
+      <p:ext uri="{BB962C8B-B14F-4D97-AF65-F5344CB8AC3E}">
+        <p14:creationId xmlns:p14="http://schemas.microsoft.com/office/powerpoint/2010/main" val="1054087615"/>
+      </p:ext>
+    </p:extLst>
+  </p:cSld>
+  <p:clrMapOvr>
+    <a:masterClrMapping/>
+  </p:clrMapOvr>
+</p:sld>
+</file>
+
+<file path=ppt/slides/slide26.xml><?xml version="1.0" encoding="utf-8"?>
+<p:sld xmlns:a="http://schemas.openxmlformats.org/drawingml/2006/main" xmlns:r="http://schemas.openxmlformats.org/officeDocument/2006/relationships" xmlns:p="http://schemas.openxmlformats.org/presentationml/2006/main">
+  <p:cSld>
+    <p:spTree>
+      <p:nvGrpSpPr>
+        <p:cNvPr id="1" name=""/>
+        <p:cNvGrpSpPr/>
+        <p:nvPr/>
+      </p:nvGrpSpPr>
+      <p:grpSpPr>
+        <a:xfrm>
+          <a:off x="0" y="0"/>
+          <a:ext cx="0" cy="0"/>
+          <a:chOff x="0" y="0"/>
+          <a:chExt cx="0" cy="0"/>
+        </a:xfrm>
+      </p:grpSpPr>
+      <p:sp>
+        <p:nvSpPr>
+          <p:cNvPr id="2" name="Title 1">
+            <a:extLst>
+              <a:ext uri="{FF2B5EF4-FFF2-40B4-BE49-F238E27FC236}">
+                <a16:creationId xmlns:a16="http://schemas.microsoft.com/office/drawing/2014/main" id="{36E503E1-F898-4F1C-85D8-B9333E59CBDF}"/>
+              </a:ext>
+            </a:extLst>
+          </p:cNvPr>
+          <p:cNvSpPr>
+            <a:spLocks noGrp="1"/>
+          </p:cNvSpPr>
+          <p:nvPr>
+            <p:ph type="title"/>
+          </p:nvPr>
+        </p:nvSpPr>
+        <p:spPr/>
+        <p:txBody>
+          <a:bodyPr/>
+          <a:lstStyle/>
+          <a:p>
+            <a:r>
+              <a:rPr lang="en-US" dirty="0"/>
+              <a:t>Mouse Input</a:t>
+            </a:r>
+          </a:p>
+        </p:txBody>
+      </p:sp>
+      <p:sp>
+        <p:nvSpPr>
+          <p:cNvPr id="3" name="Text Placeholder 2">
+            <a:extLst>
+              <a:ext uri="{FF2B5EF4-FFF2-40B4-BE49-F238E27FC236}">
+                <a16:creationId xmlns:a16="http://schemas.microsoft.com/office/drawing/2014/main" id="{1ECB0C60-A890-4730-948B-7211C55BDCFC}"/>
+              </a:ext>
+            </a:extLst>
+          </p:cNvPr>
+          <p:cNvSpPr>
+            <a:spLocks noGrp="1"/>
+          </p:cNvSpPr>
+          <p:nvPr>
+            <p:ph type="body" idx="1"/>
+          </p:nvPr>
+        </p:nvSpPr>
+        <p:spPr/>
+        <p:txBody>
+          <a:bodyPr/>
+          <a:lstStyle/>
+          <a:p>
+            <a:r>
+              <a:rPr lang="en-US" dirty="0"/>
+              <a:t>Stopping the loop, getting going.</a:t>
+            </a:r>
+          </a:p>
+        </p:txBody>
+      </p:sp>
+    </p:spTree>
+    <p:extLst>
+      <p:ext uri="{BB962C8B-B14F-4D97-AF65-F5344CB8AC3E}">
+        <p14:creationId xmlns:p14="http://schemas.microsoft.com/office/powerpoint/2010/main" val="2036615344"/>
+      </p:ext>
+    </p:extLst>
+  </p:cSld>
+  <p:clrMapOvr>
+    <a:masterClrMapping/>
+  </p:clrMapOvr>
+</p:sld>
+</file>
+
+<file path=ppt/slides/slide27.xml><?xml version="1.0" encoding="utf-8"?>
+<p:sld xmlns:a="http://schemas.openxmlformats.org/drawingml/2006/main" xmlns:r="http://schemas.openxmlformats.org/officeDocument/2006/relationships" xmlns:p="http://schemas.openxmlformats.org/presentationml/2006/main">
+  <p:cSld>
+    <p:spTree>
+      <p:nvGrpSpPr>
+        <p:cNvPr id="1" name=""/>
+        <p:cNvGrpSpPr/>
+        <p:nvPr/>
+      </p:nvGrpSpPr>
+      <p:grpSpPr>
+        <a:xfrm>
+          <a:off x="0" y="0"/>
+          <a:ext cx="0" cy="0"/>
+          <a:chOff x="0" y="0"/>
+          <a:chExt cx="0" cy="0"/>
+        </a:xfrm>
+      </p:grpSpPr>
+      <p:sp>
+        <p:nvSpPr>
+          <p:cNvPr id="2" name="Title 1">
+            <a:extLst>
+              <a:ext uri="{FF2B5EF4-FFF2-40B4-BE49-F238E27FC236}">
+                <a16:creationId xmlns:a16="http://schemas.microsoft.com/office/drawing/2014/main" id="{D9532C8C-6112-4EAE-B11F-A164F487A83E}"/>
+              </a:ext>
+            </a:extLst>
+          </p:cNvPr>
+          <p:cNvSpPr>
+            <a:spLocks noGrp="1"/>
+          </p:cNvSpPr>
+          <p:nvPr>
+            <p:ph type="title"/>
+          </p:nvPr>
+        </p:nvSpPr>
+        <p:spPr/>
+        <p:txBody>
+          <a:bodyPr/>
+          <a:lstStyle/>
+          <a:p>
+            <a:r>
+              <a:rPr lang="en-US" dirty="0"/>
+              <a:t>Yep</a:t>
+            </a:r>
+          </a:p>
+        </p:txBody>
+      </p:sp>
+      <p:pic>
+        <p:nvPicPr>
+          <p:cNvPr id="3074" name="Picture 2" descr="https://digitalbreed.com/wp-content/uploads/2014/02/13-repeating-pipes.gif">
+            <a:extLst>
+              <a:ext uri="{FF2B5EF4-FFF2-40B4-BE49-F238E27FC236}">
+                <a16:creationId xmlns:a16="http://schemas.microsoft.com/office/drawing/2014/main" id="{7F2BDAA4-FE23-42E5-8009-44A46633D107}"/>
+              </a:ext>
+            </a:extLst>
+          </p:cNvPr>
+          <p:cNvPicPr>
+            <a:picLocks noGrp="1" noChangeAspect="1" noChangeArrowheads="1" noCrop="1"/>
+          </p:cNvPicPr>
+          <p:nvPr>
+            <p:ph idx="1"/>
+          </p:nvPr>
+        </p:nvPicPr>
+        <p:blipFill>
+          <a:blip r:embed="rId2">
+            <a:extLst>
+              <a:ext uri="{28A0092B-C50C-407E-A947-70E740481C1C}">
+                <a14:useLocalDpi xmlns:a14="http://schemas.microsoft.com/office/drawing/2010/main" val="0"/>
+              </a:ext>
+            </a:extLst>
+          </a:blip>
+          <a:srcRect/>
+          <a:stretch>
+            <a:fillRect/>
+          </a:stretch>
+        </p:blipFill>
+        <p:spPr bwMode="auto">
+          <a:xfrm>
+            <a:off x="3275804" y="0"/>
+            <a:ext cx="5640392" cy="6858000"/>
+          </a:xfrm>
+          <a:prstGeom prst="rect">
+            <a:avLst/>
+          </a:prstGeom>
+          <a:noFill/>
+          <a:extLst>
+            <a:ext uri="{909E8E84-426E-40DD-AFC4-6F175D3DCCD1}">
+              <a14:hiddenFill xmlns:a14="http://schemas.microsoft.com/office/drawing/2010/main">
+                <a:solidFill>
+                  <a:srgbClr val="FFFFFF"/>
+                </a:solidFill>
+              </a14:hiddenFill>
+            </a:ext>
+          </a:extLst>
+        </p:spPr>
+      </p:pic>
+    </p:spTree>
+    <p:extLst>
+      <p:ext uri="{BB962C8B-B14F-4D97-AF65-F5344CB8AC3E}">
+        <p14:creationId xmlns:p14="http://schemas.microsoft.com/office/powerpoint/2010/main" val="4274368520"/>
+      </p:ext>
+    </p:extLst>
+  </p:cSld>
+  <p:clrMapOvr>
+    <a:masterClrMapping/>
+  </p:clrMapOvr>
+</p:sld>
+</file>
+
+<file path=ppt/slides/slide28.xml><?xml version="1.0" encoding="utf-8"?>
+<p:sld xmlns:a="http://schemas.openxmlformats.org/drawingml/2006/main" xmlns:r="http://schemas.openxmlformats.org/officeDocument/2006/relationships" xmlns:p="http://schemas.openxmlformats.org/presentationml/2006/main">
+  <p:cSld>
+    <p:spTree>
+      <p:nvGrpSpPr>
+        <p:cNvPr id="1" name=""/>
+        <p:cNvGrpSpPr/>
+        <p:nvPr/>
+      </p:nvGrpSpPr>
+      <p:grpSpPr>
+        <a:xfrm>
+          <a:off x="0" y="0"/>
+          <a:ext cx="0" cy="0"/>
+          <a:chOff x="0" y="0"/>
+          <a:chExt cx="0" cy="0"/>
+        </a:xfrm>
+      </p:grpSpPr>
+      <p:sp>
+        <p:nvSpPr>
+          <p:cNvPr id="2" name="Title 1">
+            <a:extLst>
+              <a:ext uri="{FF2B5EF4-FFF2-40B4-BE49-F238E27FC236}">
+                <a16:creationId xmlns:a16="http://schemas.microsoft.com/office/drawing/2014/main" id="{6212F36C-E5E5-4958-B34D-26C132F758EC}"/>
+              </a:ext>
+            </a:extLst>
+          </p:cNvPr>
+          <p:cNvSpPr>
+            <a:spLocks noGrp="1"/>
+          </p:cNvSpPr>
+          <p:nvPr>
+            <p:ph type="title"/>
+          </p:nvPr>
+        </p:nvSpPr>
+        <p:spPr/>
+        <p:txBody>
+          <a:bodyPr/>
+          <a:lstStyle/>
+          <a:p>
+            <a:r>
+              <a:rPr lang="en-US" dirty="0"/>
+              <a:t>Homework Option</a:t>
             </a:r>
           </a:p>
         </p:txBody>
@@ -4019,7 +5534,7 @@
           <p:cNvPr id="3" name="Content Placeholder 2">
             <a:extLst>
               <a:ext uri="{FF2B5EF4-FFF2-40B4-BE49-F238E27FC236}">
-                <a16:creationId xmlns:a16="http://schemas.microsoft.com/office/drawing/2014/main" id="{EEA18AB6-8469-4AB3-B1C1-239F870BBA6F}"/>
+                <a16:creationId xmlns:a16="http://schemas.microsoft.com/office/drawing/2014/main" id="{C2E81261-5717-4CE5-9918-0E872D27AE81}"/>
               </a:ext>
             </a:extLst>
           </p:cNvPr>
@@ -4036,67 +5551,50 @@
           <a:lstStyle/>
           <a:p>
             <a:r>
-              <a:rPr lang="en-US" i="1" dirty="0"/>
-              <a:t>Where is Professor Hallberg’s office?</a:t>
+              <a:rPr lang="en-US" b="1" dirty="0"/>
+              <a:t>Make an eclipse-inspired experience</a:t>
+            </a:r>
+          </a:p>
+          <a:p>
+            <a:r>
+              <a:rPr lang="en-US" dirty="0">
+                <a:hlinkClick r:id="rId2"/>
+              </a:rPr>
+              <a:t>https://codepen.io/crhallberg/pen/JrPrRz</a:t>
+            </a:r>
+            <a:r>
+              <a:rPr lang="en-US" dirty="0"/>
+              <a:t> </a:t>
+            </a:r>
+          </a:p>
+          <a:p>
+            <a:endParaRPr lang="en-US" dirty="0"/>
+          </a:p>
+          <a:p>
+            <a:r>
+              <a:rPr lang="en-US" dirty="0"/>
+              <a:t>Inspiration</a:t>
             </a:r>
           </a:p>
           <a:p>
             <a:pPr lvl="1"/>
             <a:r>
               <a:rPr lang="en-US" dirty="0"/>
-              <a:t>Adjunct office: 3</a:t>
-            </a:r>
-            <a:r>
-              <a:rPr lang="en-US" baseline="30000" dirty="0"/>
-              <a:t>rd</a:t>
+              <a:t>Vox’s eclipse video: </a:t>
+            </a:r>
+            <a:r>
+              <a:rPr lang="en-US" dirty="0">
+                <a:hlinkClick r:id="rId3"/>
+              </a:rPr>
+              <a:t>https://www.youtube.com/watch?v=9vFRZ_NFJpY</a:t>
             </a:r>
             <a:r>
               <a:rPr lang="en-US" dirty="0"/>
-              <a:t> floor, right at the end of the hall.</a:t>
+              <a:t> </a:t>
             </a:r>
           </a:p>
           <a:p>
             <a:pPr lvl="1"/>
-            <a:endParaRPr lang="en-US" dirty="0"/>
-          </a:p>
-          <a:p>
-            <a:r>
-              <a:rPr lang="en-US" i="1" dirty="0"/>
-              <a:t>When are Professor Hallberg’s office hours?</a:t>
-            </a:r>
-          </a:p>
-          <a:p>
-            <a:pPr lvl="1"/>
-            <a:r>
-              <a:rPr lang="en-US" dirty="0"/>
-              <a:t>All day Monday from 10am until class.</a:t>
-            </a:r>
-          </a:p>
-          <a:p>
-            <a:pPr lvl="1"/>
-            <a:endParaRPr lang="en-US" dirty="0"/>
-          </a:p>
-          <a:p>
-            <a:r>
-              <a:rPr lang="en-US" i="1" dirty="0"/>
-              <a:t>What three Canvas features do you find most useful?</a:t>
-            </a:r>
-          </a:p>
-          <a:p>
-            <a:pPr lvl="1"/>
-            <a:r>
-              <a:rPr lang="en-US" dirty="0"/>
-              <a:t>“First year here… so I haven’t used it much.”</a:t>
-            </a:r>
-          </a:p>
-          <a:p>
-            <a:pPr lvl="1"/>
-            <a:r>
-              <a:rPr lang="en-US" dirty="0"/>
-              <a:t>“I enjoy that there’s an app”</a:t>
-            </a:r>
-          </a:p>
-          <a:p>
             <a:endParaRPr lang="en-US" dirty="0"/>
           </a:p>
         </p:txBody>
@@ -4104,7 +5602,7 @@
     </p:spTree>
     <p:extLst>
       <p:ext uri="{BB962C8B-B14F-4D97-AF65-F5344CB8AC3E}">
-        <p14:creationId xmlns:p14="http://schemas.microsoft.com/office/powerpoint/2010/main" val="2622826793"/>
+        <p14:creationId xmlns:p14="http://schemas.microsoft.com/office/powerpoint/2010/main" val="2873513822"/>
       </p:ext>
     </p:extLst>
   </p:cSld>

</xml_diff>